<commit_message>
add notes, update score.py
</commit_message>
<xml_diff>
--- a/notes/graphs.pptx
+++ b/notes/graphs.pptx
@@ -5,10 +5,10 @@
     <p:sldMasterId id="2147483672" r:id="rId1"/>
   </p:sldMasterIdLst>
   <p:notesMasterIdLst>
-    <p:notesMasterId r:id="rId24"/>
+    <p:notesMasterId r:id="rId29"/>
   </p:notesMasterIdLst>
   <p:handoutMasterIdLst>
-    <p:handoutMasterId r:id="rId25"/>
+    <p:handoutMasterId r:id="rId30"/>
   </p:handoutMasterIdLst>
   <p:sldIdLst>
     <p:sldId id="256" r:id="rId2"/>
@@ -29,10 +29,15 @@
     <p:sldId id="301" r:id="rId17"/>
     <p:sldId id="309" r:id="rId18"/>
     <p:sldId id="310" r:id="rId19"/>
-    <p:sldId id="308" r:id="rId20"/>
-    <p:sldId id="305" r:id="rId21"/>
-    <p:sldId id="306" r:id="rId22"/>
-    <p:sldId id="307" r:id="rId23"/>
+    <p:sldId id="312" r:id="rId20"/>
+    <p:sldId id="311" r:id="rId21"/>
+    <p:sldId id="313" r:id="rId22"/>
+    <p:sldId id="315" r:id="rId23"/>
+    <p:sldId id="314" r:id="rId24"/>
+    <p:sldId id="308" r:id="rId25"/>
+    <p:sldId id="305" r:id="rId26"/>
+    <p:sldId id="306" r:id="rId27"/>
+    <p:sldId id="307" r:id="rId28"/>
   </p:sldIdLst>
   <p:sldSz cx="12192000" cy="6858000"/>
   <p:notesSz cx="9144000" cy="6858000"/>
@@ -7859,14 +7864,19 @@
             <p:ph type="title"/>
           </p:nvPr>
         </p:nvSpPr>
-        <p:spPr/>
+        <p:spPr>
+          <a:xfrm>
+            <a:off x="674370" y="365125"/>
+            <a:ext cx="10679430" cy="1325563"/>
+          </a:xfrm>
+        </p:spPr>
         <p:txBody>
           <a:bodyPr/>
           <a:lstStyle/>
           <a:p>
             <a:r>
               <a:rPr lang="en-US" dirty="0"/>
-              <a:t>Topological sort</a:t>
+              <a:t>Topological sort (acyclic graphs)</a:t>
             </a:r>
           </a:p>
         </p:txBody>
@@ -7887,10 +7897,15 @@
             <p:ph idx="1"/>
           </p:nvPr>
         </p:nvSpPr>
-        <p:spPr/>
+        <p:spPr>
+          <a:xfrm>
+            <a:off x="674370" y="1825625"/>
+            <a:ext cx="10679430" cy="4351338"/>
+          </a:xfrm>
+        </p:spPr>
         <p:txBody>
           <a:bodyPr>
-            <a:normAutofit lnSpcReduction="10000"/>
+            <a:normAutofit/>
           </a:bodyPr>
           <a:lstStyle/>
           <a:p>
@@ -7900,21 +7915,62 @@
             </a:r>
             <a:r>
               <a:rPr lang="en-US" dirty="0"/>
-              <a:t>: Find linear ordering of nodes in directed graph such that all constraints, u-&gt;v, are satisfied where u depends on v so v must come before u</a:t>
-            </a:r>
-          </a:p>
-          <a:p>
-            <a:r>
-              <a:rPr lang="en-US" dirty="0"/>
-              <a:t>Any ordering where edges all point to </a:t>
-            </a:r>
-            <a:r>
-              <a:rPr lang="en-US"/>
-              <a:t>the left </a:t>
-            </a:r>
-            <a:r>
-              <a:rPr lang="en-US" dirty="0"/>
-              <a:t>is a solution</a:t>
+              <a:t>: Find linear ordering of nodes in</a:t>
+            </a:r>
+            <a:br>
+              <a:rPr lang="en-US" dirty="0"/>
+            </a:br>
+            <a:r>
+              <a:rPr lang="en-US" dirty="0"/>
+              <a:t>directed acyclic graph such that all constraints,</a:t>
+            </a:r>
+            <a:br>
+              <a:rPr lang="en-US" dirty="0"/>
+            </a:br>
+            <a:r>
+              <a:rPr lang="en-US" dirty="0"/>
+              <a:t>u-&gt;v, are satisfied where u depends on v so</a:t>
+            </a:r>
+            <a:br>
+              <a:rPr lang="en-US" dirty="0"/>
+            </a:br>
+            <a:r>
+              <a:rPr lang="en-US" dirty="0"/>
+              <a:t>v must come before u</a:t>
+            </a:r>
+          </a:p>
+          <a:p>
+            <a:r>
+              <a:rPr lang="en-US" dirty="0"/>
+              <a:t>E.g., task ordering or course </a:t>
+            </a:r>
+            <a:r>
+              <a:rPr lang="en-US" dirty="0" err="1"/>
+              <a:t>prereq</a:t>
+            </a:r>
+            <a:r>
+              <a:rPr lang="en-US" dirty="0"/>
+              <a:t> chain. 501</a:t>
+            </a:r>
+            <a:br>
+              <a:rPr lang="en-US" dirty="0"/>
+            </a:br>
+            <a:r>
+              <a:rPr lang="en-US" dirty="0"/>
+              <a:t>depends on 501; 502,504,693 depend on 601… </a:t>
+            </a:r>
+            <a:br>
+              <a:rPr lang="en-US" dirty="0"/>
+            </a:br>
+            <a:r>
+              <a:rPr lang="en-US" dirty="0"/>
+              <a:t>Find order we should take classes</a:t>
+            </a:r>
+          </a:p>
+          <a:p>
+            <a:r>
+              <a:rPr lang="en-US" dirty="0"/>
+              <a:t>Any linear ordering where edges point to left is solution</a:t>
             </a:r>
           </a:p>
           <a:p>
@@ -7923,31 +7979,38 @@
               <a:t>Sort is not unique</a:t>
             </a:r>
           </a:p>
-          <a:p>
-            <a:r>
-              <a:rPr lang="en-US" dirty="0"/>
-              <a:t>DFS-based topological sort:  A valid sort is just the post-order graph traversal!</a:t>
-            </a:r>
-          </a:p>
-          <a:p>
-            <a:r>
-              <a:rPr lang="en-US" dirty="0"/>
-              <a:t>Well, we have to make sure to do DFS on all root nodes (nodes w/o incoming edges) but core is just DFS</a:t>
-            </a:r>
-          </a:p>
-          <a:p>
-            <a:r>
-              <a:rPr lang="en-US" dirty="0"/>
-              <a:t>With one root, it’s just </a:t>
-            </a:r>
-            <a:r>
-              <a:rPr lang="en-US" dirty="0" err="1"/>
-              <a:t>postorder</a:t>
-            </a:r>
-            <a:endParaRPr lang="en-US" dirty="0"/>
-          </a:p>
-        </p:txBody>
-      </p:sp>
+        </p:txBody>
+      </p:sp>
+      <p:pic>
+        <p:nvPicPr>
+          <p:cNvPr id="5" name="Picture 4">
+            <a:extLst>
+              <a:ext uri="{FF2B5EF4-FFF2-40B4-BE49-F238E27FC236}">
+                <a16:creationId xmlns:a16="http://schemas.microsoft.com/office/drawing/2014/main" id="{58D267DE-6D70-F94F-9D8A-509E8742AD38}"/>
+              </a:ext>
+            </a:extLst>
+          </p:cNvPr>
+          <p:cNvPicPr>
+            <a:picLocks noChangeAspect="1"/>
+          </p:cNvPicPr>
+          <p:nvPr/>
+        </p:nvPicPr>
+        <p:blipFill>
+          <a:blip r:embed="rId2"/>
+          <a:stretch>
+            <a:fillRect/>
+          </a:stretch>
+        </p:blipFill>
+        <p:spPr>
+          <a:xfrm>
+            <a:off x="8778241" y="629919"/>
+            <a:ext cx="3413759" cy="3982719"/>
+          </a:xfrm>
+          <a:prstGeom prst="rect">
+            <a:avLst/>
+          </a:prstGeom>
+        </p:spPr>
+      </p:pic>
     </p:spTree>
     <p:extLst>
       <p:ext uri="{BB962C8B-B14F-4D97-AF65-F5344CB8AC3E}">
@@ -8103,7 +8166,7 @@
           <p:cNvPr id="2" name="Title 1">
             <a:extLst>
               <a:ext uri="{FF2B5EF4-FFF2-40B4-BE49-F238E27FC236}">
-                <a16:creationId xmlns:a16="http://schemas.microsoft.com/office/drawing/2014/main" id="{1F2B352F-CE3D-7041-AD7E-CD17118D3037}"/>
+                <a16:creationId xmlns:a16="http://schemas.microsoft.com/office/drawing/2014/main" id="{65C9391A-B892-F349-BBF1-A96E0D91C19C}"/>
               </a:ext>
             </a:extLst>
           </p:cNvPr>
@@ -8121,7 +8184,7 @@
           <a:p>
             <a:r>
               <a:rPr lang="en-US" dirty="0"/>
-              <a:t>Summary</a:t>
+              <a:t>How to approach the problem</a:t>
             </a:r>
           </a:p>
         </p:txBody>
@@ -8131,7 +8194,7 @@
           <p:cNvPr id="3" name="Content Placeholder 2">
             <a:extLst>
               <a:ext uri="{FF2B5EF4-FFF2-40B4-BE49-F238E27FC236}">
-                <a16:creationId xmlns:a16="http://schemas.microsoft.com/office/drawing/2014/main" id="{7879AF3B-7FE8-2941-A4F8-C0A6F984CEB2}"/>
+                <a16:creationId xmlns:a16="http://schemas.microsoft.com/office/drawing/2014/main" id="{1FD8F6C6-C068-DE48-8688-7C0D86229477}"/>
               </a:ext>
             </a:extLst>
           </p:cNvPr>
@@ -8142,90 +8205,164 @@
             <p:ph idx="1"/>
           </p:nvPr>
         </p:nvSpPr>
-        <p:spPr/>
-        <p:txBody>
-          <a:bodyPr/>
+        <p:spPr>
+          <a:xfrm>
+            <a:off x="712470" y="1797050"/>
+            <a:ext cx="10515600" cy="4351338"/>
+          </a:xfrm>
+        </p:spPr>
+        <p:txBody>
+          <a:bodyPr>
+            <a:normAutofit lnSpcReduction="10000"/>
+          </a:bodyPr>
           <a:lstStyle/>
           <a:p>
             <a:r>
               <a:rPr lang="en-US" dirty="0"/>
-              <a:t>DFS for finding a path or multiple paths</a:t>
-            </a:r>
-          </a:p>
-          <a:p>
-            <a:r>
-              <a:rPr lang="en-US" dirty="0"/>
-              <a:t>BFS for find shortest (in edges) path or neighborhood</a:t>
-            </a:r>
-          </a:p>
-          <a:p>
-            <a:r>
-              <a:rPr lang="en-US" dirty="0"/>
-              <a:t>Recursive </a:t>
-            </a:r>
-            <a:r>
-              <a:rPr lang="en-US" dirty="0" err="1"/>
-              <a:t>alg’s</a:t>
-            </a:r>
-            <a:r>
-              <a:rPr lang="en-US" dirty="0"/>
-              <a:t> all use </a:t>
-            </a:r>
-            <a:r>
-              <a:rPr lang="en-US" b="1" dirty="0"/>
-              <a:t>visited</a:t>
-            </a:r>
-            <a:r>
-              <a:rPr lang="en-US" dirty="0"/>
-              <a:t> set to avoid cycles</a:t>
-            </a:r>
-          </a:p>
-          <a:p>
-            <a:r>
-              <a:rPr lang="en-US" dirty="0"/>
-              <a:t>Non-recursive DFS: (use work list stack)</a:t>
-            </a:r>
-          </a:p>
-          <a:p>
-            <a:pPr lvl="1"/>
-            <a:r>
-              <a:rPr lang="en-US" dirty="0"/>
-              <a:t>push targets in reverse order onto work list</a:t>
-            </a:r>
-          </a:p>
-          <a:p>
-            <a:pPr lvl="1"/>
-            <a:r>
-              <a:rPr lang="en-US" dirty="0"/>
-              <a:t>pop last work list item for next node to process</a:t>
-            </a:r>
-          </a:p>
-          <a:p>
-            <a:r>
-              <a:rPr lang="en-US" dirty="0"/>
-              <a:t>Non-recursive BFS: (use work list queue)</a:t>
-            </a:r>
-          </a:p>
-          <a:p>
-            <a:pPr lvl="1"/>
-            <a:r>
-              <a:rPr lang="en-US" dirty="0"/>
-              <a:t>push targets in order onto work list</a:t>
-            </a:r>
-          </a:p>
-          <a:p>
-            <a:pPr lvl="1"/>
-            <a:r>
-              <a:rPr lang="en-US" dirty="0"/>
-              <a:t>pull from first position</a:t>
-            </a:r>
-          </a:p>
-        </p:txBody>
-      </p:sp>
+              <a:t>What order should we do these tasks?</a:t>
+            </a:r>
+            <a:br>
+              <a:rPr lang="en-US" dirty="0"/>
+            </a:br>
+            <a:r>
+              <a:rPr lang="en-US" dirty="0"/>
+              <a:t>Think in terms of traversal order</a:t>
+            </a:r>
+          </a:p>
+          <a:p>
+            <a:endParaRPr lang="en-US" dirty="0"/>
+          </a:p>
+          <a:p>
+            <a:endParaRPr lang="en-US" dirty="0"/>
+          </a:p>
+          <a:p>
+            <a:r>
+              <a:rPr lang="en-US" dirty="0"/>
+              <a:t>What if we add party goal?</a:t>
+            </a:r>
+          </a:p>
+          <a:p>
+            <a:endParaRPr lang="en-US" dirty="0"/>
+          </a:p>
+          <a:p>
+            <a:endParaRPr lang="en-US" dirty="0"/>
+          </a:p>
+          <a:p>
+            <a:r>
+              <a:rPr lang="en-US" dirty="0"/>
+              <a:t>Cycles would cause trouble; are meaningless when</a:t>
+            </a:r>
+            <a:br>
+              <a:rPr lang="en-US" dirty="0"/>
+            </a:br>
+            <a:r>
+              <a:rPr lang="en-US" dirty="0"/>
+              <a:t>dealing with dependencies; how can 630-01 be</a:t>
+            </a:r>
+            <a:br>
+              <a:rPr lang="en-US" dirty="0"/>
+            </a:br>
+            <a:r>
+              <a:rPr lang="en-US" dirty="0"/>
+              <a:t>attended before itself?</a:t>
+            </a:r>
+          </a:p>
+        </p:txBody>
+      </p:sp>
+      <p:pic>
+        <p:nvPicPr>
+          <p:cNvPr id="5" name="Picture 4">
+            <a:extLst>
+              <a:ext uri="{FF2B5EF4-FFF2-40B4-BE49-F238E27FC236}">
+                <a16:creationId xmlns:a16="http://schemas.microsoft.com/office/drawing/2014/main" id="{E58D4851-B8B0-254E-A5E2-69132FA51C6F}"/>
+              </a:ext>
+            </a:extLst>
+          </p:cNvPr>
+          <p:cNvPicPr>
+            <a:picLocks noChangeAspect="1"/>
+          </p:cNvPicPr>
+          <p:nvPr/>
+        </p:nvPicPr>
+        <p:blipFill>
+          <a:blip r:embed="rId2"/>
+          <a:stretch>
+            <a:fillRect/>
+          </a:stretch>
+        </p:blipFill>
+        <p:spPr>
+          <a:xfrm>
+            <a:off x="8578850" y="3130709"/>
+            <a:ext cx="3289300" cy="1447800"/>
+          </a:xfrm>
+          <a:prstGeom prst="rect">
+            <a:avLst/>
+          </a:prstGeom>
+        </p:spPr>
+      </p:pic>
+      <p:pic>
+        <p:nvPicPr>
+          <p:cNvPr id="6" name="Picture 5">
+            <a:extLst>
+              <a:ext uri="{FF2B5EF4-FFF2-40B4-BE49-F238E27FC236}">
+                <a16:creationId xmlns:a16="http://schemas.microsoft.com/office/drawing/2014/main" id="{F95340B7-6B91-E143-8596-0A66A5344B66}"/>
+              </a:ext>
+            </a:extLst>
+          </p:cNvPr>
+          <p:cNvPicPr>
+            <a:picLocks noChangeAspect="1"/>
+          </p:cNvPicPr>
+          <p:nvPr/>
+        </p:nvPicPr>
+        <p:blipFill>
+          <a:blip r:embed="rId3"/>
+          <a:stretch>
+            <a:fillRect/>
+          </a:stretch>
+        </p:blipFill>
+        <p:spPr>
+          <a:xfrm>
+            <a:off x="9864090" y="5003801"/>
+            <a:ext cx="990600" cy="1143000"/>
+          </a:xfrm>
+          <a:prstGeom prst="rect">
+            <a:avLst/>
+          </a:prstGeom>
+        </p:spPr>
+      </p:pic>
+      <p:pic>
+        <p:nvPicPr>
+          <p:cNvPr id="8" name="Picture 7">
+            <a:extLst>
+              <a:ext uri="{FF2B5EF4-FFF2-40B4-BE49-F238E27FC236}">
+                <a16:creationId xmlns:a16="http://schemas.microsoft.com/office/drawing/2014/main" id="{F4DAE2B4-F0B9-6746-AB32-FF4DBCD2AE56}"/>
+              </a:ext>
+            </a:extLst>
+          </p:cNvPr>
+          <p:cNvPicPr>
+            <a:picLocks noChangeAspect="1"/>
+          </p:cNvPicPr>
+          <p:nvPr/>
+        </p:nvPicPr>
+        <p:blipFill>
+          <a:blip r:embed="rId4"/>
+          <a:stretch>
+            <a:fillRect/>
+          </a:stretch>
+        </p:blipFill>
+        <p:spPr>
+          <a:xfrm>
+            <a:off x="9641840" y="1257617"/>
+            <a:ext cx="2184400" cy="1447800"/>
+          </a:xfrm>
+          <a:prstGeom prst="rect">
+            <a:avLst/>
+          </a:prstGeom>
+        </p:spPr>
+      </p:pic>
     </p:spTree>
     <p:extLst>
       <p:ext uri="{BB962C8B-B14F-4D97-AF65-F5344CB8AC3E}">
-        <p14:creationId xmlns:p14="http://schemas.microsoft.com/office/powerpoint/2010/main" val="1653462232"/>
+        <p14:creationId xmlns:p14="http://schemas.microsoft.com/office/powerpoint/2010/main" val="1440752801"/>
       </p:ext>
     </p:extLst>
   </p:cSld>
@@ -8557,7 +8694,7 @@
           <p:cNvPr id="2" name="Title 1">
             <a:extLst>
               <a:ext uri="{FF2B5EF4-FFF2-40B4-BE49-F238E27FC236}">
-                <a16:creationId xmlns:a16="http://schemas.microsoft.com/office/drawing/2014/main" id="{DDFD2E64-84D8-A048-BE5C-C06207FAC5F2}"/>
+                <a16:creationId xmlns:a16="http://schemas.microsoft.com/office/drawing/2014/main" id="{D923F8B9-AF0B-514B-82D1-85ABBEE15D9A}"/>
               </a:ext>
             </a:extLst>
           </p:cNvPr>
@@ -8575,17 +8712,17 @@
           <a:p>
             <a:r>
               <a:rPr lang="en-US" dirty="0"/>
-              <a:t>Sample graph problems</a:t>
-            </a:r>
-          </a:p>
-        </p:txBody>
-      </p:sp>
-      <p:sp>
-        <p:nvSpPr>
-          <p:cNvPr id="3" name="Text Placeholder 2">
+              <a:t>DFS-based Topo sort implementation</a:t>
+            </a:r>
+          </a:p>
+        </p:txBody>
+      </p:sp>
+      <p:sp>
+        <p:nvSpPr>
+          <p:cNvPr id="3" name="Content Placeholder 2">
             <a:extLst>
               <a:ext uri="{FF2B5EF4-FFF2-40B4-BE49-F238E27FC236}">
-                <a16:creationId xmlns:a16="http://schemas.microsoft.com/office/drawing/2014/main" id="{389CB97C-29E6-8C4B-A5CB-F79E459454A0}"/>
+                <a16:creationId xmlns:a16="http://schemas.microsoft.com/office/drawing/2014/main" id="{795773DF-8C82-FB4E-81C4-2102CD70483E}"/>
               </a:ext>
             </a:extLst>
           </p:cNvPr>
@@ -8593,7 +8730,7 @@
             <a:spLocks noGrp="1"/>
           </p:cNvSpPr>
           <p:nvPr>
-            <p:ph type="body" idx="1"/>
+            <p:ph idx="1"/>
           </p:nvPr>
         </p:nvSpPr>
         <p:spPr/>
@@ -8601,14 +8738,52 @@
           <a:bodyPr/>
           <a:lstStyle/>
           <a:p>
-            <a:endParaRPr lang="en-US"/>
+            <a:r>
+              <a:rPr lang="en-US" dirty="0"/>
+              <a:t>Lots of very complex algorithms on the web</a:t>
+            </a:r>
+          </a:p>
+          <a:p>
+            <a:r>
+              <a:rPr lang="en-US" dirty="0"/>
+              <a:t>Simplest solution: DFS-based topological sort</a:t>
+            </a:r>
+          </a:p>
+          <a:p>
+            <a:r>
+              <a:rPr lang="en-US" dirty="0"/>
+              <a:t>A valid sort is just the post-order graph traversal!</a:t>
+            </a:r>
+          </a:p>
+          <a:p>
+            <a:r>
+              <a:rPr lang="en-US" dirty="0"/>
+              <a:t>Well, we have to make sure to do DFS on all root nodes (nodes w/o incoming edges) but core is just DFS</a:t>
+            </a:r>
+          </a:p>
+          <a:p>
+            <a:r>
+              <a:rPr lang="en-US" dirty="0"/>
+              <a:t>With one root, it’s just </a:t>
+            </a:r>
+            <a:r>
+              <a:rPr lang="en-US" dirty="0" err="1"/>
+              <a:t>postorder</a:t>
+            </a:r>
+            <a:r>
+              <a:rPr lang="en-US" dirty="0"/>
+              <a:t> traversal via DFS</a:t>
+            </a:r>
+          </a:p>
+          <a:p>
+            <a:endParaRPr lang="en-US" dirty="0"/>
           </a:p>
         </p:txBody>
       </p:sp>
     </p:spTree>
     <p:extLst>
       <p:ext uri="{BB962C8B-B14F-4D97-AF65-F5344CB8AC3E}">
-        <p14:creationId xmlns:p14="http://schemas.microsoft.com/office/powerpoint/2010/main" val="731826914"/>
+        <p14:creationId xmlns:p14="http://schemas.microsoft.com/office/powerpoint/2010/main" val="3446848248"/>
       </p:ext>
     </p:extLst>
   </p:cSld>
@@ -8640,6 +8815,1177 @@
           <p:cNvPr id="2" name="Title 1">
             <a:extLst>
               <a:ext uri="{FF2B5EF4-FFF2-40B4-BE49-F238E27FC236}">
+                <a16:creationId xmlns:a16="http://schemas.microsoft.com/office/drawing/2014/main" id="{E08C6E45-1E02-BE40-A272-B806C5DFC4A4}"/>
+              </a:ext>
+            </a:extLst>
+          </p:cNvPr>
+          <p:cNvSpPr>
+            <a:spLocks noGrp="1"/>
+          </p:cNvSpPr>
+          <p:nvPr>
+            <p:ph type="title"/>
+          </p:nvPr>
+        </p:nvSpPr>
+        <p:spPr/>
+        <p:txBody>
+          <a:bodyPr/>
+          <a:lstStyle/>
+          <a:p>
+            <a:r>
+              <a:rPr lang="en-US" dirty="0"/>
+              <a:t>Example walk through</a:t>
+            </a:r>
+          </a:p>
+        </p:txBody>
+      </p:sp>
+      <p:sp>
+        <p:nvSpPr>
+          <p:cNvPr id="3" name="Content Placeholder 2">
+            <a:extLst>
+              <a:ext uri="{FF2B5EF4-FFF2-40B4-BE49-F238E27FC236}">
+                <a16:creationId xmlns:a16="http://schemas.microsoft.com/office/drawing/2014/main" id="{CCB0AB97-0977-514C-A2D1-A6D30362D7AF}"/>
+              </a:ext>
+            </a:extLst>
+          </p:cNvPr>
+          <p:cNvSpPr>
+            <a:spLocks noGrp="1"/>
+          </p:cNvSpPr>
+          <p:nvPr>
+            <p:ph idx="1"/>
+          </p:nvPr>
+        </p:nvSpPr>
+        <p:spPr/>
+        <p:txBody>
+          <a:bodyPr/>
+          <a:lstStyle/>
+          <a:p>
+            <a:r>
+              <a:rPr lang="en-US" dirty="0"/>
+              <a:t>DFS starting with party:</a:t>
+            </a:r>
+            <a:br>
+              <a:rPr lang="en-US" dirty="0"/>
+            </a:br>
+            <a:r>
+              <a:rPr lang="en-US" dirty="0"/>
+              <a:t>party -&gt; 628 -&gt; 630</a:t>
+            </a:r>
+            <a:br>
+              <a:rPr lang="en-US" dirty="0"/>
+            </a:br>
+            <a:r>
+              <a:rPr lang="en-US" dirty="0"/>
+              <a:t>back out then hit 689 then lunch</a:t>
+            </a:r>
+            <a:br>
+              <a:rPr lang="en-US" dirty="0"/>
+            </a:br>
+            <a:r>
+              <a:rPr lang="en-US" dirty="0"/>
+              <a:t>back out and hit seminar</a:t>
+            </a:r>
+          </a:p>
+          <a:p>
+            <a:r>
+              <a:rPr lang="en-US" dirty="0" err="1"/>
+              <a:t>Postorder</a:t>
+            </a:r>
+            <a:r>
+              <a:rPr lang="en-US" dirty="0"/>
+              <a:t> traversal processes </a:t>
+            </a:r>
+            <a:r>
+              <a:rPr lang="en-US" b="1" dirty="0"/>
+              <a:t>after</a:t>
+            </a:r>
+            <a:r>
+              <a:rPr lang="en-US" dirty="0"/>
+              <a:t> visiting children:</a:t>
+            </a:r>
+            <a:br>
+              <a:rPr lang="en-US" dirty="0"/>
+            </a:br>
+            <a:r>
+              <a:rPr lang="en-US" dirty="0"/>
+              <a:t>630, lunch, seminar, 689, 628, party</a:t>
+            </a:r>
+          </a:p>
+          <a:p>
+            <a:r>
+              <a:rPr lang="en-US" dirty="0"/>
+              <a:t>Solution: 630-01, lunch, seminar, 689-02, 628 </a:t>
+            </a:r>
+            <a:r>
+              <a:rPr lang="en-US" dirty="0" err="1"/>
+              <a:t>hw</a:t>
+            </a:r>
+            <a:r>
+              <a:rPr lang="en-US" dirty="0"/>
+              <a:t>, party</a:t>
+            </a:r>
+          </a:p>
+        </p:txBody>
+      </p:sp>
+      <p:pic>
+        <p:nvPicPr>
+          <p:cNvPr id="4" name="Content Placeholder 5">
+            <a:extLst>
+              <a:ext uri="{FF2B5EF4-FFF2-40B4-BE49-F238E27FC236}">
+                <a16:creationId xmlns:a16="http://schemas.microsoft.com/office/drawing/2014/main" id="{A09425AA-673D-C043-A2A6-D4BEF587D45F}"/>
+              </a:ext>
+            </a:extLst>
+          </p:cNvPr>
+          <p:cNvPicPr>
+            <a:picLocks noChangeAspect="1"/>
+          </p:cNvPicPr>
+          <p:nvPr/>
+        </p:nvPicPr>
+        <p:blipFill>
+          <a:blip r:embed="rId2"/>
+          <a:stretch>
+            <a:fillRect/>
+          </a:stretch>
+        </p:blipFill>
+        <p:spPr>
+          <a:xfrm>
+            <a:off x="8467090" y="115888"/>
+            <a:ext cx="3556000" cy="3149600"/>
+          </a:xfrm>
+          <a:prstGeom prst="rect">
+            <a:avLst/>
+          </a:prstGeom>
+        </p:spPr>
+      </p:pic>
+      <p:sp>
+        <p:nvSpPr>
+          <p:cNvPr id="5" name="TextBox 4">
+            <a:extLst>
+              <a:ext uri="{FF2B5EF4-FFF2-40B4-BE49-F238E27FC236}">
+                <a16:creationId xmlns:a16="http://schemas.microsoft.com/office/drawing/2014/main" id="{9BA726A5-1BAF-EF4C-BDD7-00AEC7A791D3}"/>
+              </a:ext>
+            </a:extLst>
+          </p:cNvPr>
+          <p:cNvSpPr txBox="1"/>
+          <p:nvPr/>
+        </p:nvSpPr>
+        <p:spPr>
+          <a:xfrm>
+            <a:off x="838200" y="6390409"/>
+            <a:ext cx="6827510" cy="369332"/>
+          </a:xfrm>
+          <a:prstGeom prst="rect">
+            <a:avLst/>
+          </a:prstGeom>
+          <a:noFill/>
+        </p:spPr>
+        <p:txBody>
+          <a:bodyPr wrap="none" rtlCol="0">
+            <a:spAutoFit/>
+          </a:bodyPr>
+          <a:lstStyle/>
+          <a:p>
+            <a:r>
+              <a:rPr lang="en-US" dirty="0"/>
+              <a:t>https://</a:t>
+            </a:r>
+            <a:r>
+              <a:rPr lang="en-US" dirty="0" err="1"/>
+              <a:t>github.com</a:t>
+            </a:r>
+            <a:r>
+              <a:rPr lang="en-US" dirty="0"/>
+              <a:t>/</a:t>
+            </a:r>
+            <a:r>
+              <a:rPr lang="en-US" dirty="0" err="1"/>
+              <a:t>parrt</a:t>
+            </a:r>
+            <a:r>
+              <a:rPr lang="en-US" dirty="0"/>
+              <a:t>/msds689/blob/master/notes/</a:t>
+            </a:r>
+            <a:r>
+              <a:rPr lang="en-US" dirty="0" err="1"/>
+              <a:t>graphs.ipynb</a:t>
+            </a:r>
+            <a:endParaRPr lang="en-US" dirty="0"/>
+          </a:p>
+        </p:txBody>
+      </p:sp>
+    </p:spTree>
+    <p:extLst>
+      <p:ext uri="{BB962C8B-B14F-4D97-AF65-F5344CB8AC3E}">
+        <p14:creationId xmlns:p14="http://schemas.microsoft.com/office/powerpoint/2010/main" val="138614496"/>
+      </p:ext>
+    </p:extLst>
+  </p:cSld>
+  <p:clrMapOvr>
+    <a:masterClrMapping/>
+  </p:clrMapOvr>
+</p:sld>
+</file>
+
+<file path=ppt/slides/slide22.xml><?xml version="1.0" encoding="utf-8"?>
+<p:sld xmlns:a="http://schemas.openxmlformats.org/drawingml/2006/main" xmlns:r="http://schemas.openxmlformats.org/officeDocument/2006/relationships" xmlns:p="http://schemas.openxmlformats.org/presentationml/2006/main">
+  <p:cSld>
+    <p:spTree>
+      <p:nvGrpSpPr>
+        <p:cNvPr id="1" name=""/>
+        <p:cNvGrpSpPr/>
+        <p:nvPr/>
+      </p:nvGrpSpPr>
+      <p:grpSpPr>
+        <a:xfrm>
+          <a:off x="0" y="0"/>
+          <a:ext cx="0" cy="0"/>
+          <a:chOff x="0" y="0"/>
+          <a:chExt cx="0" cy="0"/>
+        </a:xfrm>
+      </p:grpSpPr>
+      <p:sp>
+        <p:nvSpPr>
+          <p:cNvPr id="2" name="Title 1">
+            <a:extLst>
+              <a:ext uri="{FF2B5EF4-FFF2-40B4-BE49-F238E27FC236}">
+                <a16:creationId xmlns:a16="http://schemas.microsoft.com/office/drawing/2014/main" id="{CCE599E5-27E7-0447-A843-8A42CAB292A7}"/>
+              </a:ext>
+            </a:extLst>
+          </p:cNvPr>
+          <p:cNvSpPr>
+            <a:spLocks noGrp="1"/>
+          </p:cNvSpPr>
+          <p:nvPr>
+            <p:ph type="title"/>
+          </p:nvPr>
+        </p:nvSpPr>
+        <p:spPr/>
+        <p:txBody>
+          <a:bodyPr/>
+          <a:lstStyle/>
+          <a:p>
+            <a:r>
+              <a:rPr lang="en-US" dirty="0"/>
+              <a:t>DFS </a:t>
+            </a:r>
+            <a:r>
+              <a:rPr lang="en-US" dirty="0" err="1"/>
+              <a:t>postorder</a:t>
+            </a:r>
+            <a:r>
+              <a:rPr lang="en-US" dirty="0"/>
+              <a:t> traversal</a:t>
+            </a:r>
+          </a:p>
+        </p:txBody>
+      </p:sp>
+      <p:sp>
+        <p:nvSpPr>
+          <p:cNvPr id="3" name="Content Placeholder 2">
+            <a:extLst>
+              <a:ext uri="{FF2B5EF4-FFF2-40B4-BE49-F238E27FC236}">
+                <a16:creationId xmlns:a16="http://schemas.microsoft.com/office/drawing/2014/main" id="{520E9730-CE42-BF41-BC18-638A93B47599}"/>
+              </a:ext>
+            </a:extLst>
+          </p:cNvPr>
+          <p:cNvSpPr>
+            <a:spLocks noGrp="1"/>
+          </p:cNvSpPr>
+          <p:nvPr>
+            <p:ph idx="1"/>
+          </p:nvPr>
+        </p:nvSpPr>
+        <p:spPr/>
+        <p:txBody>
+          <a:bodyPr/>
+          <a:lstStyle/>
+          <a:p>
+            <a:endParaRPr lang="en-US"/>
+          </a:p>
+        </p:txBody>
+      </p:sp>
+      <p:sp>
+        <p:nvSpPr>
+          <p:cNvPr id="4" name="TextBox 3">
+            <a:extLst>
+              <a:ext uri="{FF2B5EF4-FFF2-40B4-BE49-F238E27FC236}">
+                <a16:creationId xmlns:a16="http://schemas.microsoft.com/office/drawing/2014/main" id="{712EE956-E443-F049-95B4-CF1AF3003A1D}"/>
+              </a:ext>
+            </a:extLst>
+          </p:cNvPr>
+          <p:cNvSpPr txBox="1"/>
+          <p:nvPr/>
+        </p:nvSpPr>
+        <p:spPr>
+          <a:xfrm>
+            <a:off x="2094980" y="2733159"/>
+            <a:ext cx="8180590" cy="2123658"/>
+          </a:xfrm>
+          <a:prstGeom prst="rect">
+            <a:avLst/>
+          </a:prstGeom>
+          <a:noFill/>
+          <a:ln>
+            <a:solidFill>
+              <a:schemeClr val="accent1"/>
+            </a:solidFill>
+          </a:ln>
+        </p:spPr>
+        <p:txBody>
+          <a:bodyPr wrap="square" rtlCol="0">
+            <a:spAutoFit/>
+          </a:bodyPr>
+          <a:lstStyle/>
+          <a:p>
+            <a:r>
+              <a:rPr lang="en-US" sz="2200" dirty="0">
+                <a:latin typeface="Monaco" charset="0"/>
+                <a:ea typeface="Monaco" charset="0"/>
+                <a:cs typeface="Monaco" charset="0"/>
+              </a:rPr>
+              <a:t>def </a:t>
+            </a:r>
+            <a:r>
+              <a:rPr lang="en-US" sz="2200" dirty="0" err="1">
+                <a:latin typeface="Monaco" charset="0"/>
+                <a:ea typeface="Monaco" charset="0"/>
+                <a:cs typeface="Monaco" charset="0"/>
+              </a:rPr>
+              <a:t>postorder</a:t>
+            </a:r>
+            <a:r>
+              <a:rPr lang="en-US" sz="2200" dirty="0">
+                <a:latin typeface="Monaco" charset="0"/>
+                <a:ea typeface="Monaco" charset="0"/>
+                <a:cs typeface="Monaco" charset="0"/>
+              </a:rPr>
+              <a:t>(</a:t>
+            </a:r>
+            <a:r>
+              <a:rPr lang="en-US" sz="2200" dirty="0" err="1">
+                <a:latin typeface="Monaco" charset="0"/>
+                <a:ea typeface="Monaco" charset="0"/>
+                <a:cs typeface="Monaco" charset="0"/>
+              </a:rPr>
+              <a:t>p:Node</a:t>
+            </a:r>
+            <a:r>
+              <a:rPr lang="en-US" sz="2200" dirty="0">
+                <a:latin typeface="Monaco" charset="0"/>
+                <a:ea typeface="Monaco" charset="0"/>
+                <a:cs typeface="Monaco" charset="0"/>
+              </a:rPr>
+              <a:t>, </a:t>
+            </a:r>
+            <a:r>
+              <a:rPr lang="en-US" sz="2200" dirty="0" err="1">
+                <a:latin typeface="Monaco" charset="0"/>
+                <a:ea typeface="Monaco" charset="0"/>
+                <a:cs typeface="Monaco" charset="0"/>
+              </a:rPr>
+              <a:t>sorted:set</a:t>
+            </a:r>
+            <a:r>
+              <a:rPr lang="en-US" sz="2200" dirty="0">
+                <a:latin typeface="Monaco" charset="0"/>
+                <a:ea typeface="Monaco" charset="0"/>
+                <a:cs typeface="Monaco" charset="0"/>
+              </a:rPr>
+              <a:t>, </a:t>
+            </a:r>
+            <a:r>
+              <a:rPr lang="en-US" sz="2200" dirty="0" err="1">
+                <a:latin typeface="Monaco" charset="0"/>
+                <a:ea typeface="Monaco" charset="0"/>
+                <a:cs typeface="Monaco" charset="0"/>
+              </a:rPr>
+              <a:t>visited:set</a:t>
+            </a:r>
+            <a:r>
+              <a:rPr lang="en-US" sz="2200" dirty="0">
+                <a:latin typeface="Monaco" charset="0"/>
+                <a:ea typeface="Monaco" charset="0"/>
+                <a:cs typeface="Monaco" charset="0"/>
+              </a:rPr>
+              <a:t>):</a:t>
+            </a:r>
+          </a:p>
+          <a:p>
+            <a:r>
+              <a:rPr lang="en-US" sz="2200" dirty="0">
+                <a:latin typeface="Monaco" charset="0"/>
+                <a:ea typeface="Monaco" charset="0"/>
+                <a:cs typeface="Monaco" charset="0"/>
+              </a:rPr>
+              <a:t>    if p in visited: return</a:t>
+            </a:r>
+          </a:p>
+          <a:p>
+            <a:r>
+              <a:rPr lang="en-US" sz="2200" dirty="0">
+                <a:latin typeface="Monaco" charset="0"/>
+                <a:ea typeface="Monaco" charset="0"/>
+                <a:cs typeface="Monaco" charset="0"/>
+              </a:rPr>
+              <a:t>    </a:t>
+            </a:r>
+            <a:r>
+              <a:rPr lang="en-US" sz="2200" dirty="0" err="1">
+                <a:latin typeface="Monaco" charset="0"/>
+                <a:ea typeface="Monaco" charset="0"/>
+                <a:cs typeface="Monaco" charset="0"/>
+              </a:rPr>
+              <a:t>visited.add</a:t>
+            </a:r>
+            <a:r>
+              <a:rPr lang="en-US" sz="2200" dirty="0">
+                <a:latin typeface="Monaco" charset="0"/>
+                <a:ea typeface="Monaco" charset="0"/>
+                <a:cs typeface="Monaco" charset="0"/>
+              </a:rPr>
+              <a:t>(p)</a:t>
+            </a:r>
+          </a:p>
+          <a:p>
+            <a:r>
+              <a:rPr lang="en-US" sz="2200" dirty="0">
+                <a:latin typeface="Monaco" charset="0"/>
+                <a:ea typeface="Monaco" charset="0"/>
+                <a:cs typeface="Monaco" charset="0"/>
+              </a:rPr>
+              <a:t>    for q in </a:t>
+            </a:r>
+            <a:r>
+              <a:rPr lang="en-US" sz="2200" dirty="0" err="1">
+                <a:latin typeface="Monaco" charset="0"/>
+                <a:ea typeface="Monaco" charset="0"/>
+                <a:cs typeface="Monaco" charset="0"/>
+              </a:rPr>
+              <a:t>p.edges</a:t>
+            </a:r>
+            <a:r>
+              <a:rPr lang="en-US" sz="2200" dirty="0">
+                <a:latin typeface="Monaco" charset="0"/>
+                <a:ea typeface="Monaco" charset="0"/>
+                <a:cs typeface="Monaco" charset="0"/>
+              </a:rPr>
+              <a:t>:</a:t>
+            </a:r>
+          </a:p>
+          <a:p>
+            <a:r>
+              <a:rPr lang="en-US" sz="2200" dirty="0">
+                <a:latin typeface="Monaco" charset="0"/>
+                <a:ea typeface="Monaco" charset="0"/>
+                <a:cs typeface="Monaco" charset="0"/>
+              </a:rPr>
+              <a:t>        </a:t>
+            </a:r>
+            <a:r>
+              <a:rPr lang="en-US" sz="2200" dirty="0" err="1">
+                <a:latin typeface="Monaco" charset="0"/>
+                <a:ea typeface="Monaco" charset="0"/>
+                <a:cs typeface="Monaco" charset="0"/>
+              </a:rPr>
+              <a:t>postorder</a:t>
+            </a:r>
+            <a:r>
+              <a:rPr lang="en-US" sz="2200" dirty="0">
+                <a:latin typeface="Monaco" charset="0"/>
+                <a:ea typeface="Monaco" charset="0"/>
+                <a:cs typeface="Monaco" charset="0"/>
+              </a:rPr>
+              <a:t>(q, sorted, visited)</a:t>
+            </a:r>
+          </a:p>
+          <a:p>
+            <a:r>
+              <a:rPr lang="en-US" sz="2200" dirty="0">
+                <a:latin typeface="Monaco" charset="0"/>
+                <a:ea typeface="Monaco" charset="0"/>
+                <a:cs typeface="Monaco" charset="0"/>
+              </a:rPr>
+              <a:t>    </a:t>
+            </a:r>
+            <a:r>
+              <a:rPr lang="en-US" sz="2200" dirty="0" err="1">
+                <a:latin typeface="Monaco" charset="0"/>
+                <a:ea typeface="Monaco" charset="0"/>
+                <a:cs typeface="Monaco" charset="0"/>
+              </a:rPr>
+              <a:t>sorted.append</a:t>
+            </a:r>
+            <a:r>
+              <a:rPr lang="en-US" sz="2200" dirty="0">
+                <a:latin typeface="Monaco" charset="0"/>
+                <a:ea typeface="Monaco" charset="0"/>
+                <a:cs typeface="Monaco" charset="0"/>
+              </a:rPr>
+              <a:t>(p)</a:t>
+            </a:r>
+            <a:endParaRPr lang="mr-IN" sz="2200" dirty="0">
+              <a:latin typeface="Monaco" charset="0"/>
+              <a:ea typeface="Monaco" charset="0"/>
+              <a:cs typeface="Monaco" charset="0"/>
+            </a:endParaRPr>
+          </a:p>
+        </p:txBody>
+      </p:sp>
+    </p:spTree>
+    <p:extLst>
+      <p:ext uri="{BB962C8B-B14F-4D97-AF65-F5344CB8AC3E}">
+        <p14:creationId xmlns:p14="http://schemas.microsoft.com/office/powerpoint/2010/main" val="1541564467"/>
+      </p:ext>
+    </p:extLst>
+  </p:cSld>
+  <p:clrMapOvr>
+    <a:masterClrMapping/>
+  </p:clrMapOvr>
+</p:sld>
+</file>
+
+<file path=ppt/slides/slide23.xml><?xml version="1.0" encoding="utf-8"?>
+<p:sld xmlns:a="http://schemas.openxmlformats.org/drawingml/2006/main" xmlns:r="http://schemas.openxmlformats.org/officeDocument/2006/relationships" xmlns:p="http://schemas.openxmlformats.org/presentationml/2006/main">
+  <p:cSld>
+    <p:spTree>
+      <p:nvGrpSpPr>
+        <p:cNvPr id="1" name=""/>
+        <p:cNvGrpSpPr/>
+        <p:nvPr/>
+      </p:nvGrpSpPr>
+      <p:grpSpPr>
+        <a:xfrm>
+          <a:off x="0" y="0"/>
+          <a:ext cx="0" cy="0"/>
+          <a:chOff x="0" y="0"/>
+          <a:chExt cx="0" cy="0"/>
+        </a:xfrm>
+      </p:grpSpPr>
+      <p:sp>
+        <p:nvSpPr>
+          <p:cNvPr id="2" name="Title 1">
+            <a:extLst>
+              <a:ext uri="{FF2B5EF4-FFF2-40B4-BE49-F238E27FC236}">
+                <a16:creationId xmlns:a16="http://schemas.microsoft.com/office/drawing/2014/main" id="{B4BFD031-F900-244E-9173-BC71EA251890}"/>
+              </a:ext>
+            </a:extLst>
+          </p:cNvPr>
+          <p:cNvSpPr>
+            <a:spLocks noGrp="1"/>
+          </p:cNvSpPr>
+          <p:nvPr>
+            <p:ph type="title"/>
+          </p:nvPr>
+        </p:nvSpPr>
+        <p:spPr/>
+        <p:txBody>
+          <a:bodyPr/>
+          <a:lstStyle/>
+          <a:p>
+            <a:r>
+              <a:rPr lang="en-US" dirty="0"/>
+              <a:t>With multiple roots, hit them all</a:t>
+            </a:r>
+          </a:p>
+        </p:txBody>
+      </p:sp>
+      <p:pic>
+        <p:nvPicPr>
+          <p:cNvPr id="4" name="Picture 3">
+            <a:extLst>
+              <a:ext uri="{FF2B5EF4-FFF2-40B4-BE49-F238E27FC236}">
+                <a16:creationId xmlns:a16="http://schemas.microsoft.com/office/drawing/2014/main" id="{93A77130-306B-E044-AE01-0FC15CC22F46}"/>
+              </a:ext>
+            </a:extLst>
+          </p:cNvPr>
+          <p:cNvPicPr>
+            <a:picLocks noChangeAspect="1"/>
+          </p:cNvPicPr>
+          <p:nvPr/>
+        </p:nvPicPr>
+        <p:blipFill>
+          <a:blip r:embed="rId2"/>
+          <a:stretch>
+            <a:fillRect/>
+          </a:stretch>
+        </p:blipFill>
+        <p:spPr>
+          <a:xfrm>
+            <a:off x="8778241" y="1545649"/>
+            <a:ext cx="3413759" cy="3982719"/>
+          </a:xfrm>
+          <a:prstGeom prst="rect">
+            <a:avLst/>
+          </a:prstGeom>
+        </p:spPr>
+      </p:pic>
+      <p:sp>
+        <p:nvSpPr>
+          <p:cNvPr id="5" name="TextBox 4">
+            <a:extLst>
+              <a:ext uri="{FF2B5EF4-FFF2-40B4-BE49-F238E27FC236}">
+                <a16:creationId xmlns:a16="http://schemas.microsoft.com/office/drawing/2014/main" id="{59796E16-26E5-4D42-94C1-C870B629D3B1}"/>
+              </a:ext>
+            </a:extLst>
+          </p:cNvPr>
+          <p:cNvSpPr txBox="1"/>
+          <p:nvPr/>
+        </p:nvSpPr>
+        <p:spPr>
+          <a:xfrm>
+            <a:off x="220200" y="1967349"/>
+            <a:ext cx="8260600" cy="3139321"/>
+          </a:xfrm>
+          <a:prstGeom prst="rect">
+            <a:avLst/>
+          </a:prstGeom>
+          <a:noFill/>
+          <a:ln>
+            <a:solidFill>
+              <a:schemeClr val="accent1"/>
+            </a:solidFill>
+          </a:ln>
+        </p:spPr>
+        <p:txBody>
+          <a:bodyPr wrap="square" rtlCol="0">
+            <a:spAutoFit/>
+          </a:bodyPr>
+          <a:lstStyle/>
+          <a:p>
+            <a:r>
+              <a:rPr lang="en-US" sz="2200" dirty="0">
+                <a:latin typeface="Monaco" charset="0"/>
+                <a:ea typeface="Monaco" charset="0"/>
+                <a:cs typeface="Monaco" charset="0"/>
+              </a:rPr>
+              <a:t>def </a:t>
+            </a:r>
+            <a:r>
+              <a:rPr lang="en-US" sz="2200" dirty="0" err="1">
+                <a:latin typeface="Monaco" charset="0"/>
+                <a:ea typeface="Monaco" charset="0"/>
+                <a:cs typeface="Monaco" charset="0"/>
+              </a:rPr>
+              <a:t>toposort</a:t>
+            </a:r>
+            <a:r>
+              <a:rPr lang="en-US" sz="2200" dirty="0">
+                <a:latin typeface="Monaco" charset="0"/>
+                <a:ea typeface="Monaco" charset="0"/>
+                <a:cs typeface="Monaco" charset="0"/>
+              </a:rPr>
+              <a:t>(nodes):</a:t>
+            </a:r>
+          </a:p>
+          <a:p>
+            <a:r>
+              <a:rPr lang="en-US" sz="2200" dirty="0">
+                <a:latin typeface="Monaco" charset="0"/>
+                <a:ea typeface="Monaco" charset="0"/>
+                <a:cs typeface="Monaco" charset="0"/>
+              </a:rPr>
+              <a:t>    sorted = []</a:t>
+            </a:r>
+          </a:p>
+          <a:p>
+            <a:r>
+              <a:rPr lang="en-US" sz="2200" dirty="0">
+                <a:latin typeface="Monaco" charset="0"/>
+                <a:ea typeface="Monaco" charset="0"/>
+                <a:cs typeface="Monaco" charset="0"/>
+              </a:rPr>
+              <a:t>    visited = set()</a:t>
+            </a:r>
+          </a:p>
+          <a:p>
+            <a:r>
+              <a:rPr lang="en-US" sz="2200" dirty="0">
+                <a:latin typeface="Monaco" charset="0"/>
+                <a:ea typeface="Monaco" charset="0"/>
+                <a:cs typeface="Monaco" charset="0"/>
+              </a:rPr>
+              <a:t>    while </a:t>
+            </a:r>
+            <a:r>
+              <a:rPr lang="en-US" sz="2200" dirty="0" err="1">
+                <a:latin typeface="Monaco" charset="0"/>
+                <a:ea typeface="Monaco" charset="0"/>
+                <a:cs typeface="Monaco" charset="0"/>
+              </a:rPr>
+              <a:t>len</a:t>
+            </a:r>
+            <a:r>
+              <a:rPr lang="en-US" sz="2200" dirty="0">
+                <a:latin typeface="Monaco" charset="0"/>
+                <a:ea typeface="Monaco" charset="0"/>
+                <a:cs typeface="Monaco" charset="0"/>
+              </a:rPr>
+              <a:t>(visited) &lt; </a:t>
+            </a:r>
+            <a:r>
+              <a:rPr lang="en-US" sz="2200" dirty="0" err="1">
+                <a:latin typeface="Monaco" charset="0"/>
+                <a:ea typeface="Monaco" charset="0"/>
+                <a:cs typeface="Monaco" charset="0"/>
+              </a:rPr>
+              <a:t>len</a:t>
+            </a:r>
+            <a:r>
+              <a:rPr lang="en-US" sz="2200" dirty="0">
+                <a:latin typeface="Monaco" charset="0"/>
+                <a:ea typeface="Monaco" charset="0"/>
+                <a:cs typeface="Monaco" charset="0"/>
+              </a:rPr>
+              <a:t>(nodes):</a:t>
+            </a:r>
+          </a:p>
+          <a:p>
+            <a:r>
+              <a:rPr lang="en-US" sz="2200" dirty="0">
+                <a:latin typeface="Monaco" charset="0"/>
+                <a:ea typeface="Monaco" charset="0"/>
+                <a:cs typeface="Monaco" charset="0"/>
+              </a:rPr>
+              <a:t>        </a:t>
+            </a:r>
+            <a:r>
+              <a:rPr lang="en-US" sz="2200" dirty="0" err="1">
+                <a:latin typeface="Monaco" charset="0"/>
+                <a:ea typeface="Monaco" charset="0"/>
+                <a:cs typeface="Monaco" charset="0"/>
+              </a:rPr>
+              <a:t>todo</a:t>
+            </a:r>
+            <a:r>
+              <a:rPr lang="en-US" sz="2200" dirty="0">
+                <a:latin typeface="Monaco" charset="0"/>
+                <a:ea typeface="Monaco" charset="0"/>
+                <a:cs typeface="Monaco" charset="0"/>
+              </a:rPr>
+              <a:t> = [node for node in </a:t>
+            </a:r>
+            <a:r>
+              <a:rPr lang="en-US" sz="2200" dirty="0" err="1">
+                <a:latin typeface="Monaco" charset="0"/>
+                <a:ea typeface="Monaco" charset="0"/>
+                <a:cs typeface="Monaco" charset="0"/>
+              </a:rPr>
+              <a:t>nodes.values</a:t>
+            </a:r>
+            <a:r>
+              <a:rPr lang="en-US" sz="2200" dirty="0">
+                <a:latin typeface="Monaco" charset="0"/>
+                <a:ea typeface="Monaco" charset="0"/>
+                <a:cs typeface="Monaco" charset="0"/>
+              </a:rPr>
+              <a:t>()</a:t>
+            </a:r>
+          </a:p>
+          <a:p>
+            <a:r>
+              <a:rPr lang="en-US" sz="2200" dirty="0">
+                <a:latin typeface="Monaco" charset="0"/>
+                <a:ea typeface="Monaco" charset="0"/>
+                <a:cs typeface="Monaco" charset="0"/>
+              </a:rPr>
+              <a:t>                if node not in visited]</a:t>
+            </a:r>
+          </a:p>
+          <a:p>
+            <a:r>
+              <a:rPr lang="en-US" sz="2200" dirty="0">
+                <a:latin typeface="Monaco" charset="0"/>
+                <a:ea typeface="Monaco" charset="0"/>
+                <a:cs typeface="Monaco" charset="0"/>
+              </a:rPr>
+              <a:t>        if </a:t>
+            </a:r>
+            <a:r>
+              <a:rPr lang="en-US" sz="2200" dirty="0" err="1">
+                <a:latin typeface="Monaco" charset="0"/>
+                <a:ea typeface="Monaco" charset="0"/>
+                <a:cs typeface="Monaco" charset="0"/>
+              </a:rPr>
+              <a:t>len</a:t>
+            </a:r>
+            <a:r>
+              <a:rPr lang="en-US" sz="2200" dirty="0">
+                <a:latin typeface="Monaco" charset="0"/>
+                <a:ea typeface="Monaco" charset="0"/>
+                <a:cs typeface="Monaco" charset="0"/>
+              </a:rPr>
+              <a:t>(</a:t>
+            </a:r>
+            <a:r>
+              <a:rPr lang="en-US" sz="2200" dirty="0" err="1">
+                <a:latin typeface="Monaco" charset="0"/>
+                <a:ea typeface="Monaco" charset="0"/>
+                <a:cs typeface="Monaco" charset="0"/>
+              </a:rPr>
+              <a:t>todo</a:t>
+            </a:r>
+            <a:r>
+              <a:rPr lang="en-US" sz="2200" dirty="0">
+                <a:latin typeface="Monaco" charset="0"/>
+                <a:ea typeface="Monaco" charset="0"/>
+                <a:cs typeface="Monaco" charset="0"/>
+              </a:rPr>
+              <a:t>)&gt;0:</a:t>
+            </a:r>
+          </a:p>
+          <a:p>
+            <a:r>
+              <a:rPr lang="en-US" sz="2200" dirty="0">
+                <a:latin typeface="Monaco" charset="0"/>
+                <a:ea typeface="Monaco" charset="0"/>
+                <a:cs typeface="Monaco" charset="0"/>
+              </a:rPr>
+              <a:t>            </a:t>
+            </a:r>
+            <a:r>
+              <a:rPr lang="en-US" sz="2200" dirty="0" err="1">
+                <a:latin typeface="Monaco" charset="0"/>
+                <a:ea typeface="Monaco" charset="0"/>
+                <a:cs typeface="Monaco" charset="0"/>
+              </a:rPr>
+              <a:t>postorder</a:t>
+            </a:r>
+            <a:r>
+              <a:rPr lang="en-US" sz="2200" dirty="0">
+                <a:latin typeface="Monaco" charset="0"/>
+                <a:ea typeface="Monaco" charset="0"/>
+                <a:cs typeface="Monaco" charset="0"/>
+              </a:rPr>
+              <a:t>(</a:t>
+            </a:r>
+            <a:r>
+              <a:rPr lang="en-US" sz="2200" dirty="0" err="1">
+                <a:latin typeface="Monaco" charset="0"/>
+                <a:ea typeface="Monaco" charset="0"/>
+                <a:cs typeface="Monaco" charset="0"/>
+              </a:rPr>
+              <a:t>todo</a:t>
+            </a:r>
+            <a:r>
+              <a:rPr lang="en-US" sz="2200" dirty="0">
+                <a:latin typeface="Monaco" charset="0"/>
+                <a:ea typeface="Monaco" charset="0"/>
+                <a:cs typeface="Monaco" charset="0"/>
+              </a:rPr>
+              <a:t>[0], sorted, visited)</a:t>
+            </a:r>
+          </a:p>
+          <a:p>
+            <a:r>
+              <a:rPr lang="en-US" sz="2200" dirty="0">
+                <a:latin typeface="Monaco" charset="0"/>
+                <a:ea typeface="Monaco" charset="0"/>
+                <a:cs typeface="Monaco" charset="0"/>
+              </a:rPr>
+              <a:t>    return sorted</a:t>
+            </a:r>
+            <a:endParaRPr lang="mr-IN" sz="2200" dirty="0">
+              <a:latin typeface="Monaco" charset="0"/>
+              <a:ea typeface="Monaco" charset="0"/>
+              <a:cs typeface="Monaco" charset="0"/>
+            </a:endParaRPr>
+          </a:p>
+        </p:txBody>
+      </p:sp>
+    </p:spTree>
+    <p:extLst>
+      <p:ext uri="{BB962C8B-B14F-4D97-AF65-F5344CB8AC3E}">
+        <p14:creationId xmlns:p14="http://schemas.microsoft.com/office/powerpoint/2010/main" val="4052054853"/>
+      </p:ext>
+    </p:extLst>
+  </p:cSld>
+  <p:clrMapOvr>
+    <a:masterClrMapping/>
+  </p:clrMapOvr>
+</p:sld>
+</file>
+
+<file path=ppt/slides/slide24.xml><?xml version="1.0" encoding="utf-8"?>
+<p:sld xmlns:a="http://schemas.openxmlformats.org/drawingml/2006/main" xmlns:r="http://schemas.openxmlformats.org/officeDocument/2006/relationships" xmlns:p="http://schemas.openxmlformats.org/presentationml/2006/main">
+  <p:cSld>
+    <p:spTree>
+      <p:nvGrpSpPr>
+        <p:cNvPr id="1" name=""/>
+        <p:cNvGrpSpPr/>
+        <p:nvPr/>
+      </p:nvGrpSpPr>
+      <p:grpSpPr>
+        <a:xfrm>
+          <a:off x="0" y="0"/>
+          <a:ext cx="0" cy="0"/>
+          <a:chOff x="0" y="0"/>
+          <a:chExt cx="0" cy="0"/>
+        </a:xfrm>
+      </p:grpSpPr>
+      <p:sp>
+        <p:nvSpPr>
+          <p:cNvPr id="2" name="Title 1">
+            <a:extLst>
+              <a:ext uri="{FF2B5EF4-FFF2-40B4-BE49-F238E27FC236}">
+                <a16:creationId xmlns:a16="http://schemas.microsoft.com/office/drawing/2014/main" id="{1F2B352F-CE3D-7041-AD7E-CD17118D3037}"/>
+              </a:ext>
+            </a:extLst>
+          </p:cNvPr>
+          <p:cNvSpPr>
+            <a:spLocks noGrp="1"/>
+          </p:cNvSpPr>
+          <p:nvPr>
+            <p:ph type="title"/>
+          </p:nvPr>
+        </p:nvSpPr>
+        <p:spPr/>
+        <p:txBody>
+          <a:bodyPr/>
+          <a:lstStyle/>
+          <a:p>
+            <a:r>
+              <a:rPr lang="en-US" dirty="0"/>
+              <a:t>Summary</a:t>
+            </a:r>
+          </a:p>
+        </p:txBody>
+      </p:sp>
+      <p:sp>
+        <p:nvSpPr>
+          <p:cNvPr id="3" name="Content Placeholder 2">
+            <a:extLst>
+              <a:ext uri="{FF2B5EF4-FFF2-40B4-BE49-F238E27FC236}">
+                <a16:creationId xmlns:a16="http://schemas.microsoft.com/office/drawing/2014/main" id="{7879AF3B-7FE8-2941-A4F8-C0A6F984CEB2}"/>
+              </a:ext>
+            </a:extLst>
+          </p:cNvPr>
+          <p:cNvSpPr>
+            <a:spLocks noGrp="1"/>
+          </p:cNvSpPr>
+          <p:nvPr>
+            <p:ph idx="1"/>
+          </p:nvPr>
+        </p:nvSpPr>
+        <p:spPr/>
+        <p:txBody>
+          <a:bodyPr>
+            <a:normAutofit fontScale="92500" lnSpcReduction="20000"/>
+          </a:bodyPr>
+          <a:lstStyle/>
+          <a:p>
+            <a:r>
+              <a:rPr lang="en-US" dirty="0"/>
+              <a:t>Graphs are for showing relationships between elements</a:t>
+            </a:r>
+          </a:p>
+          <a:p>
+            <a:r>
+              <a:rPr lang="en-US" dirty="0"/>
+              <a:t>DFS for finding a path or multiple paths</a:t>
+            </a:r>
+          </a:p>
+          <a:p>
+            <a:r>
+              <a:rPr lang="en-US" dirty="0"/>
+              <a:t>BFS for find shortest (in edges) path or neighborhood</a:t>
+            </a:r>
+          </a:p>
+          <a:p>
+            <a:r>
+              <a:rPr lang="en-US" dirty="0"/>
+              <a:t>DFS </a:t>
+            </a:r>
+            <a:r>
+              <a:rPr lang="en-US" dirty="0" err="1"/>
+              <a:t>postorder</a:t>
+            </a:r>
+            <a:r>
+              <a:rPr lang="en-US"/>
+              <a:t> great for topo sort</a:t>
+            </a:r>
+            <a:endParaRPr lang="en-US" dirty="0"/>
+          </a:p>
+          <a:p>
+            <a:r>
+              <a:rPr lang="en-US" dirty="0"/>
+              <a:t>Recursive </a:t>
+            </a:r>
+            <a:r>
+              <a:rPr lang="en-US" dirty="0" err="1"/>
+              <a:t>alg’s</a:t>
+            </a:r>
+            <a:r>
+              <a:rPr lang="en-US" dirty="0"/>
+              <a:t> all use </a:t>
+            </a:r>
+            <a:r>
+              <a:rPr lang="en-US" b="1" dirty="0"/>
+              <a:t>visited</a:t>
+            </a:r>
+            <a:r>
+              <a:rPr lang="en-US" dirty="0"/>
+              <a:t> set to avoid cycles</a:t>
+            </a:r>
+          </a:p>
+          <a:p>
+            <a:r>
+              <a:rPr lang="en-US" dirty="0"/>
+              <a:t>Non-recursive DFS: (use work list stack)</a:t>
+            </a:r>
+          </a:p>
+          <a:p>
+            <a:pPr lvl="1"/>
+            <a:r>
+              <a:rPr lang="en-US" dirty="0"/>
+              <a:t>push targets in reverse order onto work list</a:t>
+            </a:r>
+          </a:p>
+          <a:p>
+            <a:pPr lvl="1"/>
+            <a:r>
+              <a:rPr lang="en-US" dirty="0"/>
+              <a:t>pop last work list item for next node to process</a:t>
+            </a:r>
+          </a:p>
+          <a:p>
+            <a:r>
+              <a:rPr lang="en-US" dirty="0"/>
+              <a:t>Non-recursive BFS: (use work list queue)</a:t>
+            </a:r>
+          </a:p>
+          <a:p>
+            <a:pPr lvl="1"/>
+            <a:r>
+              <a:rPr lang="en-US" dirty="0"/>
+              <a:t>push targets in order onto work list</a:t>
+            </a:r>
+          </a:p>
+          <a:p>
+            <a:pPr lvl="1"/>
+            <a:r>
+              <a:rPr lang="en-US" dirty="0"/>
+              <a:t>pull from first position</a:t>
+            </a:r>
+          </a:p>
+        </p:txBody>
+      </p:sp>
+    </p:spTree>
+    <p:extLst>
+      <p:ext uri="{BB962C8B-B14F-4D97-AF65-F5344CB8AC3E}">
+        <p14:creationId xmlns:p14="http://schemas.microsoft.com/office/powerpoint/2010/main" val="1653462232"/>
+      </p:ext>
+    </p:extLst>
+  </p:cSld>
+  <p:clrMapOvr>
+    <a:masterClrMapping/>
+  </p:clrMapOvr>
+</p:sld>
+</file>
+
+<file path=ppt/slides/slide25.xml><?xml version="1.0" encoding="utf-8"?>
+<p:sld xmlns:a="http://schemas.openxmlformats.org/drawingml/2006/main" xmlns:r="http://schemas.openxmlformats.org/officeDocument/2006/relationships" xmlns:p="http://schemas.openxmlformats.org/presentationml/2006/main">
+  <p:cSld>
+    <p:spTree>
+      <p:nvGrpSpPr>
+        <p:cNvPr id="1" name=""/>
+        <p:cNvGrpSpPr/>
+        <p:nvPr/>
+      </p:nvGrpSpPr>
+      <p:grpSpPr>
+        <a:xfrm>
+          <a:off x="0" y="0"/>
+          <a:ext cx="0" cy="0"/>
+          <a:chOff x="0" y="0"/>
+          <a:chExt cx="0" cy="0"/>
+        </a:xfrm>
+      </p:grpSpPr>
+      <p:sp>
+        <p:nvSpPr>
+          <p:cNvPr id="2" name="Title 1">
+            <a:extLst>
+              <a:ext uri="{FF2B5EF4-FFF2-40B4-BE49-F238E27FC236}">
+                <a16:creationId xmlns:a16="http://schemas.microsoft.com/office/drawing/2014/main" id="{DDFD2E64-84D8-A048-BE5C-C06207FAC5F2}"/>
+              </a:ext>
+            </a:extLst>
+          </p:cNvPr>
+          <p:cNvSpPr>
+            <a:spLocks noGrp="1"/>
+          </p:cNvSpPr>
+          <p:nvPr>
+            <p:ph type="title"/>
+          </p:nvPr>
+        </p:nvSpPr>
+        <p:spPr/>
+        <p:txBody>
+          <a:bodyPr/>
+          <a:lstStyle/>
+          <a:p>
+            <a:r>
+              <a:rPr lang="en-US" dirty="0"/>
+              <a:t>Sample graph problems</a:t>
+            </a:r>
+          </a:p>
+        </p:txBody>
+      </p:sp>
+      <p:sp>
+        <p:nvSpPr>
+          <p:cNvPr id="3" name="Text Placeholder 2">
+            <a:extLst>
+              <a:ext uri="{FF2B5EF4-FFF2-40B4-BE49-F238E27FC236}">
+                <a16:creationId xmlns:a16="http://schemas.microsoft.com/office/drawing/2014/main" id="{389CB97C-29E6-8C4B-A5CB-F79E459454A0}"/>
+              </a:ext>
+            </a:extLst>
+          </p:cNvPr>
+          <p:cNvSpPr>
+            <a:spLocks noGrp="1"/>
+          </p:cNvSpPr>
+          <p:nvPr>
+            <p:ph type="body" idx="1"/>
+          </p:nvPr>
+        </p:nvSpPr>
+        <p:spPr/>
+        <p:txBody>
+          <a:bodyPr/>
+          <a:lstStyle/>
+          <a:p>
+            <a:endParaRPr lang="en-US"/>
+          </a:p>
+        </p:txBody>
+      </p:sp>
+    </p:spTree>
+    <p:extLst>
+      <p:ext uri="{BB962C8B-B14F-4D97-AF65-F5344CB8AC3E}">
+        <p14:creationId xmlns:p14="http://schemas.microsoft.com/office/powerpoint/2010/main" val="731826914"/>
+      </p:ext>
+    </p:extLst>
+  </p:cSld>
+  <p:clrMapOvr>
+    <a:masterClrMapping/>
+  </p:clrMapOvr>
+</p:sld>
+</file>
+
+<file path=ppt/slides/slide26.xml><?xml version="1.0" encoding="utf-8"?>
+<p:sld xmlns:a="http://schemas.openxmlformats.org/drawingml/2006/main" xmlns:r="http://schemas.openxmlformats.org/officeDocument/2006/relationships" xmlns:p="http://schemas.openxmlformats.org/presentationml/2006/main">
+  <p:cSld>
+    <p:spTree>
+      <p:nvGrpSpPr>
+        <p:cNvPr id="1" name=""/>
+        <p:cNvGrpSpPr/>
+        <p:nvPr/>
+      </p:nvGrpSpPr>
+      <p:grpSpPr>
+        <a:xfrm>
+          <a:off x="0" y="0"/>
+          <a:ext cx="0" cy="0"/>
+          <a:chOff x="0" y="0"/>
+          <a:chExt cx="0" cy="0"/>
+        </a:xfrm>
+      </p:grpSpPr>
+      <p:sp>
+        <p:nvSpPr>
+          <p:cNvPr id="2" name="Title 1">
+            <a:extLst>
+              <a:ext uri="{FF2B5EF4-FFF2-40B4-BE49-F238E27FC236}">
                 <a16:creationId xmlns:a16="http://schemas.microsoft.com/office/drawing/2014/main" id="{7F191B5F-D0CE-BA41-A73B-830D9FB97B84}"/>
               </a:ext>
             </a:extLst>
@@ -8728,7 +10074,7 @@
 </p:sld>
 </file>
 
-<file path=ppt/slides/slide22.xml><?xml version="1.0" encoding="utf-8"?>
+<file path=ppt/slides/slide27.xml><?xml version="1.0" encoding="utf-8"?>
 <p:sld xmlns:a="http://schemas.openxmlformats.org/drawingml/2006/main" xmlns:r="http://schemas.openxmlformats.org/officeDocument/2006/relationships" xmlns:p="http://schemas.openxmlformats.org/presentationml/2006/main">
   <p:cSld>
     <p:spTree>
@@ -8967,7 +10313,7 @@
           <a:p>
             <a:r>
               <a:rPr lang="en-US" dirty="0"/>
-              <a:t>Find all English words possible by taking one adjacent step to another letter, starting with any letter; one occurrence of each letter per word; you’re given a dictionary (/</a:t>
+              <a:t>Given m x n matrix of letters. Find all English words possible by taking one adjacent step to another letter, starting with any letter; one occurrence of each letter per word; you’re given a dictionary (/</a:t>
             </a:r>
             <a:r>
               <a:rPr lang="en-US" dirty="0" err="1"/>
@@ -8975,7 +10321,7 @@
             </a:r>
             <a:r>
               <a:rPr lang="en-US" dirty="0"/>
-              <a:t>/local/</a:t>
+              <a:t>/share/</a:t>
             </a:r>
             <a:r>
               <a:rPr lang="en-US" dirty="0" err="1"/>
@@ -9010,7 +10356,7 @@
         </p:blipFill>
         <p:spPr>
           <a:xfrm>
-            <a:off x="9808047" y="145778"/>
+            <a:off x="2622215" y="3666217"/>
             <a:ext cx="2115727" cy="1371735"/>
           </a:xfrm>
           <a:prstGeom prst="rect">
@@ -9040,7 +10386,7 @@
         </p:blipFill>
         <p:spPr>
           <a:xfrm>
-            <a:off x="9713974" y="3277394"/>
+            <a:off x="6521957" y="3628185"/>
             <a:ext cx="2209800" cy="1447800"/>
           </a:xfrm>
           <a:prstGeom prst="rect">
@@ -9087,6 +10433,51 @@
                                     <p:set>
                                       <p:cBhvr>
                                         <p:cTn id="6" dur="1" fill="hold">
+                                          <p:stCondLst>
+                                            <p:cond delay="0"/>
+                                          </p:stCondLst>
+                                        </p:cTn>
+                                        <p:tgtEl>
+                                          <p:spTgt spid="7"/>
+                                        </p:tgtEl>
+                                        <p:attrNameLst>
+                                          <p:attrName>style.visibility</p:attrName>
+                                        </p:attrNameLst>
+                                      </p:cBhvr>
+                                      <p:to>
+                                        <p:strVal val="visible"/>
+                                      </p:to>
+                                    </p:set>
+                                  </p:childTnLst>
+                                </p:cTn>
+                              </p:par>
+                            </p:childTnLst>
+                          </p:cTn>
+                        </p:par>
+                      </p:childTnLst>
+                    </p:cTn>
+                  </p:par>
+                  <p:par>
+                    <p:cTn id="7" fill="hold">
+                      <p:stCondLst>
+                        <p:cond delay="indefinite"/>
+                      </p:stCondLst>
+                      <p:childTnLst>
+                        <p:par>
+                          <p:cTn id="8" fill="hold">
+                            <p:stCondLst>
+                              <p:cond delay="0"/>
+                            </p:stCondLst>
+                            <p:childTnLst>
+                              <p:par>
+                                <p:cTn id="9" presetID="1" presetClass="entr" presetSubtype="0" fill="hold" nodeType="clickEffect">
+                                  <p:stCondLst>
+                                    <p:cond delay="0"/>
+                                  </p:stCondLst>
+                                  <p:childTnLst>
+                                    <p:set>
+                                      <p:cBhvr>
+                                        <p:cTn id="10" dur="1" fill="hold">
                                           <p:stCondLst>
                                             <p:cond delay="0"/>
                                           </p:stCondLst>

</xml_diff>